<commit_message>
Yet another minor edit
</commit_message>
<xml_diff>
--- a/Poster.pptx
+++ b/Poster.pptx
@@ -3542,7 +3542,7 @@
         <p:spPr>
           <a:xfrm>
             <a:off x="16195412" y="21891430"/>
-            <a:ext cx="13487400" cy="8402300"/>
+            <a:ext cx="13487400" cy="2862322"/>
           </a:xfrm>
           <a:prstGeom prst="rect">
             <a:avLst/>
@@ -3585,75 +3585,8 @@
             </a:pPr>
             <a:r>
               <a:rPr lang="en-US" sz="6000" dirty="0" smtClean="0"/>
-              <a:t>Seth Ward, ECE – </a:t>
-            </a:r>
-            <a:r>
-              <a:rPr lang="en-US" sz="6000" smtClean="0"/>
-              <a:t>Project FW </a:t>
-            </a:r>
-            <a:r>
-              <a:rPr lang="en-US" sz="6000" dirty="0" smtClean="0"/>
-              <a:t>Designer</a:t>
-            </a:r>
-          </a:p>
-          <a:p>
-            <a:pPr marL="857250" indent="-857250">
-              <a:buFont typeface="Arial" panose="020B0604020202020204" pitchFamily="34" charset="0"/>
-              <a:buChar char="•"/>
-            </a:pPr>
-            <a:endParaRPr lang="en-US" sz="6000" dirty="0" smtClean="0"/>
-          </a:p>
-          <a:p>
-            <a:r>
-              <a:rPr lang="en-US" sz="6000" dirty="0" smtClean="0"/>
-              <a:t>Special thanks to:</a:t>
-            </a:r>
-          </a:p>
-          <a:p>
-            <a:pPr marL="857250" indent="-857250">
-              <a:buFont typeface="Arial" panose="020B0604020202020204" pitchFamily="34" charset="0"/>
-              <a:buChar char="•"/>
-            </a:pPr>
-            <a:r>
-              <a:rPr lang="en-US" sz="6000" dirty="0" smtClean="0"/>
-              <a:t>Andrew Greenberg</a:t>
-            </a:r>
-          </a:p>
-          <a:p>
-            <a:pPr marL="857250" indent="-857250">
-              <a:buFont typeface="Arial" panose="020B0604020202020204" pitchFamily="34" charset="0"/>
-              <a:buChar char="•"/>
-            </a:pPr>
-            <a:r>
-              <a:rPr lang="en-US" sz="6000" dirty="0" smtClean="0"/>
-              <a:t>K. Wilson</a:t>
-            </a:r>
-          </a:p>
-          <a:p>
-            <a:pPr marL="857250" indent="-857250">
-              <a:buFont typeface="Arial" panose="020B0604020202020204" pitchFamily="34" charset="0"/>
-              <a:buChar char="•"/>
-            </a:pPr>
-            <a:r>
-              <a:rPr lang="en-US" sz="6000" dirty="0" smtClean="0"/>
-              <a:t>Gavin </a:t>
-            </a:r>
-            <a:r>
-              <a:rPr lang="en-US" sz="6000" dirty="0" err="1" smtClean="0"/>
-              <a:t>Gallino</a:t>
-            </a:r>
-            <a:endParaRPr lang="en-US" sz="6000" dirty="0" smtClean="0"/>
-          </a:p>
-          <a:p>
-            <a:pPr marL="857250" indent="-857250">
-              <a:buFont typeface="Arial" panose="020B0604020202020204" pitchFamily="34" charset="0"/>
-              <a:buChar char="•"/>
-            </a:pPr>
-            <a:r>
-              <a:rPr lang="en-US" sz="6000" dirty="0" smtClean="0"/>
-              <a:t>Dave Camarillo</a:t>
-            </a:r>
-            <a:endParaRPr lang="en-US" sz="6000" dirty="0"/>
+              <a:t>Seth Ward, ECE – Project FW Designer</a:t>
+            </a:r>
           </a:p>
         </p:txBody>
       </p:sp>
@@ -3698,6 +3631,110 @@
                 <a:srgbClr val="6A7F10"/>
               </a:solidFill>
             </a:endParaRPr>
+          </a:p>
+        </p:txBody>
+      </p:sp>
+      <p:sp>
+        <p:nvSpPr>
+          <p:cNvPr id="26" name="TextBox 25"/>
+          <p:cNvSpPr txBox="1"/>
+          <p:nvPr/>
+        </p:nvSpPr>
+        <p:spPr>
+          <a:xfrm>
+            <a:off x="16195412" y="25953340"/>
+            <a:ext cx="13487400" cy="3785652"/>
+          </a:xfrm>
+          <a:prstGeom prst="rect">
+            <a:avLst/>
+          </a:prstGeom>
+          <a:noFill/>
+        </p:spPr>
+        <p:txBody>
+          <a:bodyPr wrap="square" numCol="2" rtlCol="0">
+            <a:spAutoFit/>
+          </a:bodyPr>
+          <a:lstStyle/>
+          <a:p>
+            <a:endParaRPr lang="en-US" sz="6000" dirty="0" smtClean="0"/>
+          </a:p>
+          <a:p>
+            <a:pPr marL="857250" indent="-857250">
+              <a:buFont typeface="Arial" panose="020B0604020202020204" pitchFamily="34" charset="0"/>
+              <a:buChar char="•"/>
+            </a:pPr>
+            <a:r>
+              <a:rPr lang="en-US" sz="6000" dirty="0" smtClean="0"/>
+              <a:t>Andrew Greenberg</a:t>
+            </a:r>
+          </a:p>
+          <a:p>
+            <a:pPr marL="857250" indent="-857250">
+              <a:buFont typeface="Arial" panose="020B0604020202020204" pitchFamily="34" charset="0"/>
+              <a:buChar char="•"/>
+            </a:pPr>
+            <a:r>
+              <a:rPr lang="en-US" sz="6000" dirty="0" smtClean="0"/>
+              <a:t>K. Wilson</a:t>
+            </a:r>
+          </a:p>
+          <a:p>
+            <a:endParaRPr lang="en-US" sz="6000" dirty="0" smtClean="0"/>
+          </a:p>
+          <a:p>
+            <a:pPr marL="857250" indent="-857250">
+              <a:buFont typeface="Arial" panose="020B0604020202020204" pitchFamily="34" charset="0"/>
+              <a:buChar char="•"/>
+            </a:pPr>
+            <a:r>
+              <a:rPr lang="en-US" sz="6000" dirty="0" smtClean="0"/>
+              <a:t>Gavin </a:t>
+            </a:r>
+            <a:r>
+              <a:rPr lang="en-US" sz="6000" dirty="0" err="1" smtClean="0"/>
+              <a:t>Gallino</a:t>
+            </a:r>
+            <a:endParaRPr lang="en-US" sz="6000" dirty="0" smtClean="0"/>
+          </a:p>
+          <a:p>
+            <a:pPr marL="857250" indent="-857250">
+              <a:buFont typeface="Arial" panose="020B0604020202020204" pitchFamily="34" charset="0"/>
+              <a:buChar char="•"/>
+            </a:pPr>
+            <a:r>
+              <a:rPr lang="en-US" sz="6000" dirty="0" smtClean="0"/>
+              <a:t>Dave Camarillo</a:t>
+            </a:r>
+            <a:endParaRPr lang="en-US" sz="6000" dirty="0"/>
+          </a:p>
+        </p:txBody>
+      </p:sp>
+      <p:sp>
+        <p:nvSpPr>
+          <p:cNvPr id="27" name="TextBox 26"/>
+          <p:cNvSpPr txBox="1"/>
+          <p:nvPr/>
+        </p:nvSpPr>
+        <p:spPr>
+          <a:xfrm>
+            <a:off x="16228069" y="25873913"/>
+            <a:ext cx="13487400" cy="1015663"/>
+          </a:xfrm>
+          <a:prstGeom prst="rect">
+            <a:avLst/>
+          </a:prstGeom>
+          <a:noFill/>
+        </p:spPr>
+        <p:txBody>
+          <a:bodyPr wrap="square" rtlCol="0">
+            <a:spAutoFit/>
+          </a:bodyPr>
+          <a:lstStyle/>
+          <a:p>
+            <a:r>
+              <a:rPr lang="en-US" sz="6000" dirty="0" smtClean="0"/>
+              <a:t>Special thanks to:</a:t>
+            </a:r>
           </a:p>
         </p:txBody>
       </p:sp>

</xml_diff>

<commit_message>
Formated special thanks text box
</commit_message>
<xml_diff>
--- a/Poster.pptx
+++ b/Poster.pptx
@@ -3643,7 +3643,7 @@
         <p:spPr>
           <a:xfrm>
             <a:off x="16195412" y="25953340"/>
-            <a:ext cx="13487400" cy="3785652"/>
+            <a:ext cx="14684446" cy="3785652"/>
           </a:xfrm>
           <a:prstGeom prst="rect">
             <a:avLst/>
@@ -3679,6 +3679,13 @@
             </a:r>
           </a:p>
           <a:p>
+            <a:endParaRPr lang="en-US" sz="6000" dirty="0" smtClean="0"/>
+          </a:p>
+          <a:p>
+            <a:pPr marL="857250" indent="-857250">
+              <a:buFont typeface="Arial" panose="020B0604020202020204" pitchFamily="34" charset="0"/>
+              <a:buChar char="•"/>
+            </a:pPr>
             <a:endParaRPr lang="en-US" sz="6000" dirty="0" smtClean="0"/>
           </a:p>
           <a:p>

</xml_diff>

<commit_message>
added updated campairison chart
</commit_message>
<xml_diff>
--- a/Poster.pptx
+++ b/Poster.pptx
@@ -3189,28 +3189,27 @@
       </p:sp>
       <p:pic>
         <p:nvPicPr>
-          <p:cNvPr id="11" name="Picture 10" descr="Screen Shot 2015-05-05 at 8.21.23 PM.png"/>
+          <p:cNvPr id="11" name="Picture 10"/>
           <p:cNvPicPr>
             <a:picLocks noChangeAspect="1"/>
           </p:cNvPicPr>
           <p:nvPr/>
         </p:nvPicPr>
-        <p:blipFill>
-          <a:blip r:embed="rId2">
+        <p:blipFill rotWithShape="1">
+          <a:blip r:embed="rId2" cstate="print">
             <a:extLst>
               <a:ext uri="{28A0092B-C50C-407E-A947-70E740481C1C}">
-                <a14:useLocalDpi xmlns:a14="http://schemas.microsoft.com/office/drawing/2010/main" val="0"/>
+                <a14:useLocalDpi xmlns:a14="http://schemas.microsoft.com/office/drawing/2010/main"/>
               </a:ext>
             </a:extLst>
           </a:blip>
-          <a:stretch>
-            <a:fillRect/>
-          </a:stretch>
+          <a:srcRect l="2722" t="7731" r="6528" b="8318"/>
+          <a:stretch/>
         </p:blipFill>
         <p:spPr>
           <a:xfrm>
-            <a:off x="15433981" y="11223306"/>
-            <a:ext cx="15042920" cy="8764845"/>
+            <a:off x="15891788" y="11293174"/>
+            <a:ext cx="14106967" cy="8444136"/>
           </a:xfrm>
           <a:prstGeom prst="rect">
             <a:avLst/>
@@ -3297,7 +3296,7 @@
           <a:blip r:embed="rId4" cstate="print">
             <a:extLst>
               <a:ext uri="{28A0092B-C50C-407E-A947-70E740481C1C}">
-                <a14:useLocalDpi xmlns:a14="http://schemas.microsoft.com/office/drawing/2010/main" val="0"/>
+                <a14:useLocalDpi xmlns:a14="http://schemas.microsoft.com/office/drawing/2010/main"/>
               </a:ext>
             </a:extLst>
           </a:blip>
@@ -3759,7 +3758,7 @@
           <a:blip r:embed="rId5">
             <a:extLst>
               <a:ext uri="{28A0092B-C50C-407E-A947-70E740481C1C}">
-                <a14:useLocalDpi xmlns:a14="http://schemas.microsoft.com/office/drawing/2010/main" val="0"/>
+                <a14:useLocalDpi xmlns:a14="http://schemas.microsoft.com/office/drawing/2010/main"/>
               </a:ext>
             </a:extLst>
           </a:blip>

</xml_diff>

<commit_message>
Added block diagram and changed some layout
</commit_message>
<xml_diff>
--- a/Poster.pptx
+++ b/Poster.pptx
@@ -300,7 +300,7 @@
             <a:fld id="{D9D26CB9-01E4-44B8-8084-BCC418CF4A2D}" type="datetimeFigureOut">
               <a:rPr lang="en-US" smtClean="0"/>
               <a:pPr/>
-              <a:t>5/18/15</a:t>
+              <a:t>5/20/15</a:t>
             </a:fld>
             <a:endParaRPr lang="en-US"/>
           </a:p>
@@ -467,7 +467,7 @@
             <a:fld id="{D9D26CB9-01E4-44B8-8084-BCC418CF4A2D}" type="datetimeFigureOut">
               <a:rPr lang="en-US" smtClean="0"/>
               <a:pPr/>
-              <a:t>5/18/15</a:t>
+              <a:t>5/20/15</a:t>
             </a:fld>
             <a:endParaRPr lang="en-US"/>
           </a:p>
@@ -644,7 +644,7 @@
             <a:fld id="{D9D26CB9-01E4-44B8-8084-BCC418CF4A2D}" type="datetimeFigureOut">
               <a:rPr lang="en-US" smtClean="0"/>
               <a:pPr/>
-              <a:t>5/18/15</a:t>
+              <a:t>5/20/15</a:t>
             </a:fld>
             <a:endParaRPr lang="en-US"/>
           </a:p>
@@ -811,7 +811,7 @@
             <a:fld id="{D9D26CB9-01E4-44B8-8084-BCC418CF4A2D}" type="datetimeFigureOut">
               <a:rPr lang="en-US" smtClean="0"/>
               <a:pPr/>
-              <a:t>5/18/15</a:t>
+              <a:t>5/20/15</a:t>
             </a:fld>
             <a:endParaRPr lang="en-US"/>
           </a:p>
@@ -1054,7 +1054,7 @@
             <a:fld id="{D9D26CB9-01E4-44B8-8084-BCC418CF4A2D}" type="datetimeFigureOut">
               <a:rPr lang="en-US" smtClean="0"/>
               <a:pPr/>
-              <a:t>5/18/15</a:t>
+              <a:t>5/20/15</a:t>
             </a:fld>
             <a:endParaRPr lang="en-US"/>
           </a:p>
@@ -1339,7 +1339,7 @@
             <a:fld id="{D9D26CB9-01E4-44B8-8084-BCC418CF4A2D}" type="datetimeFigureOut">
               <a:rPr lang="en-US" smtClean="0"/>
               <a:pPr/>
-              <a:t>5/18/15</a:t>
+              <a:t>5/20/15</a:t>
             </a:fld>
             <a:endParaRPr lang="en-US"/>
           </a:p>
@@ -1758,7 +1758,7 @@
             <a:fld id="{D9D26CB9-01E4-44B8-8084-BCC418CF4A2D}" type="datetimeFigureOut">
               <a:rPr lang="en-US" smtClean="0"/>
               <a:pPr/>
-              <a:t>5/18/15</a:t>
+              <a:t>5/20/15</a:t>
             </a:fld>
             <a:endParaRPr lang="en-US"/>
           </a:p>
@@ -1873,7 +1873,7 @@
             <a:fld id="{D9D26CB9-01E4-44B8-8084-BCC418CF4A2D}" type="datetimeFigureOut">
               <a:rPr lang="en-US" smtClean="0"/>
               <a:pPr/>
-              <a:t>5/18/15</a:t>
+              <a:t>5/20/15</a:t>
             </a:fld>
             <a:endParaRPr lang="en-US"/>
           </a:p>
@@ -1965,7 +1965,7 @@
             <a:fld id="{D9D26CB9-01E4-44B8-8084-BCC418CF4A2D}" type="datetimeFigureOut">
               <a:rPr lang="en-US" smtClean="0"/>
               <a:pPr/>
-              <a:t>5/18/15</a:t>
+              <a:t>5/20/15</a:t>
             </a:fld>
             <a:endParaRPr lang="en-US"/>
           </a:p>
@@ -2239,7 +2239,7 @@
             <a:fld id="{D9D26CB9-01E4-44B8-8084-BCC418CF4A2D}" type="datetimeFigureOut">
               <a:rPr lang="en-US" smtClean="0"/>
               <a:pPr/>
-              <a:t>5/18/15</a:t>
+              <a:t>5/20/15</a:t>
             </a:fld>
             <a:endParaRPr lang="en-US"/>
           </a:p>
@@ -2489,7 +2489,7 @@
             <a:fld id="{D9D26CB9-01E4-44B8-8084-BCC418CF4A2D}" type="datetimeFigureOut">
               <a:rPr lang="en-US" smtClean="0"/>
               <a:pPr/>
-              <a:t>5/18/15</a:t>
+              <a:t>5/20/15</a:t>
             </a:fld>
             <a:endParaRPr lang="en-US"/>
           </a:p>
@@ -2699,7 +2699,7 @@
             <a:fld id="{D9D26CB9-01E4-44B8-8084-BCC418CF4A2D}" type="datetimeFigureOut">
               <a:rPr lang="en-US" smtClean="0"/>
               <a:pPr/>
-              <a:t>5/18/15</a:t>
+              <a:t>5/20/15</a:t>
             </a:fld>
             <a:endParaRPr lang="en-US"/>
           </a:p>
@@ -3116,8 +3116,8 @@
         </p:nvSpPr>
         <p:spPr>
           <a:xfrm>
-            <a:off x="16228069" y="9448800"/>
-            <a:ext cx="13454743" cy="1413391"/>
+            <a:off x="29260800" y="5257801"/>
+            <a:ext cx="13683343" cy="1413391"/>
           </a:xfrm>
           <a:prstGeom prst="rect">
             <a:avLst/>
@@ -3196,20 +3196,20 @@
           <p:nvPr/>
         </p:nvPicPr>
         <p:blipFill rotWithShape="1">
-          <a:blip r:embed="rId2" cstate="print">
+          <a:blip r:embed="rId2">
             <a:extLst>
               <a:ext uri="{28A0092B-C50C-407E-A947-70E740481C1C}">
-                <a14:useLocalDpi xmlns:a14="http://schemas.microsoft.com/office/drawing/2010/main"/>
+                <a14:useLocalDpi xmlns:a14="http://schemas.microsoft.com/office/drawing/2010/main" val="0"/>
               </a:ext>
             </a:extLst>
           </a:blip>
-          <a:srcRect l="2722" t="7731" r="6528" b="8318"/>
+          <a:srcRect l="4262" t="8660" r="7819" b="8715"/>
           <a:stretch/>
         </p:blipFill>
         <p:spPr>
           <a:xfrm>
-            <a:off x="15891788" y="11293174"/>
-            <a:ext cx="14106967" cy="8444136"/>
+            <a:off x="29489400" y="7010400"/>
+            <a:ext cx="13238313" cy="8165592"/>
           </a:xfrm>
           <a:prstGeom prst="rect">
             <a:avLst/>
@@ -3240,50 +3240,6 @@
           </a:prstGeom>
         </p:spPr>
       </p:pic>
-      <p:sp>
-        <p:nvSpPr>
-          <p:cNvPr id="2" name="TextBox 1"/>
-          <p:cNvSpPr txBox="1"/>
-          <p:nvPr/>
-        </p:nvSpPr>
-        <p:spPr>
-          <a:xfrm>
-            <a:off x="997527" y="5295538"/>
-            <a:ext cx="13487400" cy="1431161"/>
-          </a:xfrm>
-          <a:prstGeom prst="rect">
-            <a:avLst/>
-          </a:prstGeom>
-          <a:noFill/>
-          <a:ln>
-            <a:solidFill>
-              <a:schemeClr val="accent1"/>
-            </a:solidFill>
-          </a:ln>
-        </p:spPr>
-        <p:txBody>
-          <a:bodyPr wrap="square" rtlCol="0">
-            <a:spAutoFit/>
-          </a:bodyPr>
-          <a:lstStyle/>
-          <a:p>
-            <a:pPr algn="ctr"/>
-            <a:r>
-              <a:rPr lang="en-US" dirty="0" smtClean="0">
-                <a:solidFill>
-                  <a:srgbClr val="6A7F10"/>
-                </a:solidFill>
-              </a:rPr>
-              <a:t>Summary</a:t>
-            </a:r>
-            <a:endParaRPr lang="en-US" dirty="0">
-              <a:solidFill>
-                <a:srgbClr val="6A7F10"/>
-              </a:solidFill>
-            </a:endParaRPr>
-          </a:p>
-        </p:txBody>
-      </p:sp>
       <p:pic>
         <p:nvPicPr>
           <p:cNvPr id="6" name="Picture 5"/>
@@ -3306,7 +3262,7 @@
         </p:blipFill>
         <p:spPr>
           <a:xfrm>
-            <a:off x="30879858" y="5295538"/>
+            <a:off x="15773400" y="21412200"/>
             <a:ext cx="12535283" cy="6993555"/>
           </a:xfrm>
           <a:prstGeom prst="rect">
@@ -3314,67 +3270,296 @@
           </a:prstGeom>
         </p:spPr>
       </p:pic>
-      <p:sp>
-        <p:nvSpPr>
-          <p:cNvPr id="12" name="TextBox 11"/>
+      <p:grpSp>
+        <p:nvGrpSpPr>
+          <p:cNvPr id="18" name="Group 17"/>
+          <p:cNvGrpSpPr/>
+          <p:nvPr/>
+        </p:nvGrpSpPr>
+        <p:grpSpPr>
+          <a:xfrm>
+            <a:off x="990600" y="5257800"/>
+            <a:ext cx="13494327" cy="8441239"/>
+            <a:chOff x="990600" y="5257800"/>
+            <a:chExt cx="13494327" cy="8441239"/>
+          </a:xfrm>
+        </p:grpSpPr>
+        <p:sp>
+          <p:nvSpPr>
+            <p:cNvPr id="2" name="TextBox 1"/>
+            <p:cNvSpPr txBox="1"/>
+            <p:nvPr/>
+          </p:nvSpPr>
+          <p:spPr>
+            <a:xfrm>
+              <a:off x="990600" y="5257800"/>
+              <a:ext cx="13487400" cy="1431161"/>
+            </a:xfrm>
+            <a:prstGeom prst="rect">
+              <a:avLst/>
+            </a:prstGeom>
+            <a:noFill/>
+            <a:ln>
+              <a:solidFill>
+                <a:schemeClr val="accent1"/>
+              </a:solidFill>
+            </a:ln>
+          </p:spPr>
+          <p:txBody>
+            <a:bodyPr wrap="square" rtlCol="0">
+              <a:spAutoFit/>
+            </a:bodyPr>
+            <a:lstStyle/>
+            <a:p>
+              <a:pPr algn="ctr"/>
+              <a:r>
+                <a:rPr lang="en-US" dirty="0" smtClean="0">
+                  <a:solidFill>
+                    <a:srgbClr val="6A7F10"/>
+                  </a:solidFill>
+                </a:rPr>
+                <a:t>Summary</a:t>
+              </a:r>
+              <a:endParaRPr lang="en-US" dirty="0">
+                <a:solidFill>
+                  <a:srgbClr val="6A7F10"/>
+                </a:solidFill>
+              </a:endParaRPr>
+            </a:p>
+          </p:txBody>
+        </p:sp>
+        <p:sp>
+          <p:nvSpPr>
+            <p:cNvPr id="12" name="TextBox 11"/>
+            <p:cNvSpPr txBox="1"/>
+            <p:nvPr/>
+          </p:nvSpPr>
+          <p:spPr>
+            <a:xfrm>
+              <a:off x="997527" y="6835623"/>
+              <a:ext cx="13487400" cy="6863416"/>
+            </a:xfrm>
+            <a:prstGeom prst="rect">
+              <a:avLst/>
+            </a:prstGeom>
+            <a:noFill/>
+          </p:spPr>
+          <p:txBody>
+            <a:bodyPr wrap="square" rtlCol="0">
+              <a:spAutoFit/>
+            </a:bodyPr>
+            <a:lstStyle/>
+            <a:p>
+              <a:r>
+                <a:rPr lang="en-US" sz="4400" dirty="0" smtClean="0"/>
+                <a:t>The Marionette DAQ is a an open source industrial quality data acquisition device designed for the Portland State Aerospace Society. The underlying goal of the project is to provide a DAQ that is:</a:t>
+              </a:r>
+              <a:br>
+                <a:rPr lang="en-US" sz="4400" dirty="0" smtClean="0"/>
+              </a:br>
+              <a:endParaRPr lang="en-US" sz="4400" dirty="0" smtClean="0"/>
+            </a:p>
+            <a:p>
+              <a:pPr marL="857250" indent="-857250">
+                <a:buFont typeface="Arial" panose="020B0604020202020204" pitchFamily="34" charset="0"/>
+                <a:buChar char="•"/>
+              </a:pPr>
+              <a:r>
+                <a:rPr lang="en-US" sz="4400" b="1" dirty="0" smtClean="0"/>
+                <a:t>Completely Open Source </a:t>
+              </a:r>
+              <a:r>
+                <a:rPr lang="en-US" sz="4400" dirty="0" smtClean="0"/>
+                <a:t>(hardware, firmware, and Interface software).</a:t>
+              </a:r>
+            </a:p>
+            <a:p>
+              <a:pPr marL="857250" indent="-857250">
+                <a:buFont typeface="Arial" panose="020B0604020202020204" pitchFamily="34" charset="0"/>
+                <a:buChar char="•"/>
+              </a:pPr>
+              <a:r>
+                <a:rPr lang="en-US" sz="4400" dirty="0" smtClean="0"/>
+                <a:t>Provides </a:t>
+              </a:r>
+              <a:r>
+                <a:rPr lang="en-US" sz="4400" b="1" dirty="0" smtClean="0"/>
+                <a:t>more connectivity </a:t>
+              </a:r>
+              <a:r>
+                <a:rPr lang="en-US" sz="4400" dirty="0" smtClean="0"/>
+                <a:t>than any other device currently on the market.</a:t>
+              </a:r>
+            </a:p>
+            <a:p>
+              <a:pPr marL="857250" indent="-857250">
+                <a:buFont typeface="Arial" panose="020B0604020202020204" pitchFamily="34" charset="0"/>
+                <a:buChar char="•"/>
+              </a:pPr>
+              <a:r>
+                <a:rPr lang="en-US" sz="4400" dirty="0" smtClean="0"/>
+                <a:t>All for an </a:t>
+              </a:r>
+              <a:r>
+                <a:rPr lang="en-US" sz="4400" b="1" dirty="0" smtClean="0"/>
+                <a:t>affordable</a:t>
+              </a:r>
+              <a:r>
+                <a:rPr lang="en-US" sz="4400" dirty="0" smtClean="0"/>
+                <a:t> (to students) cost.</a:t>
+              </a:r>
+            </a:p>
+          </p:txBody>
+        </p:sp>
+      </p:grpSp>
+      <p:grpSp>
+        <p:nvGrpSpPr>
+          <p:cNvPr id="17" name="Group 16"/>
+          <p:cNvGrpSpPr/>
+          <p:nvPr/>
+        </p:nvGrpSpPr>
+        <p:grpSpPr>
+          <a:xfrm>
+            <a:off x="15163800" y="5257800"/>
+            <a:ext cx="13716000" cy="6508492"/>
+            <a:chOff x="15163800" y="5257800"/>
+            <a:chExt cx="13716000" cy="6508492"/>
+          </a:xfrm>
+        </p:grpSpPr>
+        <p:sp>
+          <p:nvSpPr>
+            <p:cNvPr id="20" name="TextBox 19"/>
+            <p:cNvSpPr txBox="1"/>
+            <p:nvPr/>
+          </p:nvSpPr>
+          <p:spPr>
+            <a:xfrm>
+              <a:off x="15163800" y="5257800"/>
+              <a:ext cx="13563600" cy="1431161"/>
+            </a:xfrm>
+            <a:prstGeom prst="rect">
+              <a:avLst/>
+            </a:prstGeom>
+            <a:noFill/>
+            <a:ln>
+              <a:solidFill>
+                <a:schemeClr val="accent1"/>
+              </a:solidFill>
+            </a:ln>
+          </p:spPr>
+          <p:txBody>
+            <a:bodyPr wrap="square" rtlCol="0">
+              <a:spAutoFit/>
+            </a:bodyPr>
+            <a:lstStyle/>
+            <a:p>
+              <a:pPr algn="ctr"/>
+              <a:r>
+                <a:rPr lang="en-US" dirty="0" smtClean="0">
+                  <a:solidFill>
+                    <a:srgbClr val="6A7F10"/>
+                  </a:solidFill>
+                </a:rPr>
+                <a:t>Solution</a:t>
+              </a:r>
+              <a:endParaRPr lang="en-US" dirty="0">
+                <a:solidFill>
+                  <a:srgbClr val="6A7F10"/>
+                </a:solidFill>
+              </a:endParaRPr>
+            </a:p>
+          </p:txBody>
+        </p:sp>
+        <p:sp>
+          <p:nvSpPr>
+            <p:cNvPr id="21" name="TextBox 20"/>
+            <p:cNvSpPr txBox="1"/>
+            <p:nvPr/>
+          </p:nvSpPr>
+          <p:spPr>
+            <a:xfrm>
+              <a:off x="15163800" y="6934200"/>
+              <a:ext cx="13716000" cy="4832092"/>
+            </a:xfrm>
+            <a:prstGeom prst="rect">
+              <a:avLst/>
+            </a:prstGeom>
+            <a:noFill/>
+          </p:spPr>
+          <p:txBody>
+            <a:bodyPr wrap="square" rtlCol="0">
+              <a:spAutoFit/>
+            </a:bodyPr>
+            <a:lstStyle/>
+            <a:p>
+              <a:pPr marL="857250" indent="-857250">
+                <a:buFont typeface="Arial" panose="020B0604020202020204" pitchFamily="34" charset="0"/>
+                <a:buChar char="•"/>
+              </a:pPr>
+              <a:r>
+                <a:rPr lang="en-US" sz="4400" dirty="0" smtClean="0"/>
+                <a:t>Off the shelf 32bit microcontroller with USB 2.1 High Speed.</a:t>
+              </a:r>
+            </a:p>
+            <a:p>
+              <a:pPr marL="857250" indent="-857250">
+                <a:buFont typeface="Arial" panose="020B0604020202020204" pitchFamily="34" charset="0"/>
+                <a:buChar char="•"/>
+              </a:pPr>
+              <a:r>
+                <a:rPr lang="en-US" sz="4400" dirty="0" smtClean="0"/>
+                <a:t>Easy to assemble, components can be placed by hand.</a:t>
+              </a:r>
+            </a:p>
+            <a:p>
+              <a:pPr marL="857250" indent="-857250">
+                <a:buFont typeface="Arial" panose="020B0604020202020204" pitchFamily="34" charset="0"/>
+                <a:buChar char="•"/>
+              </a:pPr>
+              <a:r>
+                <a:rPr lang="en-US" sz="4400" dirty="0" smtClean="0"/>
+                <a:t>A real time operating system (</a:t>
+              </a:r>
+              <a:r>
+                <a:rPr lang="en-US" sz="4400" dirty="0" err="1" smtClean="0"/>
+                <a:t>ChibiOS</a:t>
+              </a:r>
+              <a:r>
+                <a:rPr lang="en-US" sz="4400" dirty="0" smtClean="0"/>
+                <a:t>) with customized drivers and libraries</a:t>
+              </a:r>
+            </a:p>
+            <a:p>
+              <a:pPr marL="857250" indent="-857250">
+                <a:buFont typeface="Arial" panose="020B0604020202020204" pitchFamily="34" charset="0"/>
+                <a:buChar char="•"/>
+              </a:pPr>
+              <a:r>
+                <a:rPr lang="en-US" sz="4400" dirty="0" smtClean="0"/>
+                <a:t>Uses the Python scripting language for a fully customizable, </a:t>
+              </a:r>
+              <a:r>
+                <a:rPr lang="en-US" sz="4400" dirty="0"/>
+                <a:t>cross-platform </a:t>
+              </a:r>
+              <a:r>
+                <a:rPr lang="en-US" sz="4400" dirty="0" smtClean="0"/>
+                <a:t>user interface. </a:t>
+              </a:r>
+              <a:endParaRPr lang="en-US" sz="4400" dirty="0"/>
+            </a:p>
+          </p:txBody>
+        </p:sp>
+      </p:grpSp>
+      <p:sp>
+        <p:nvSpPr>
+          <p:cNvPr id="25" name="TextBox 24"/>
           <p:cNvSpPr txBox="1"/>
           <p:nvPr/>
         </p:nvSpPr>
         <p:spPr>
           <a:xfrm>
-            <a:off x="997527" y="6835623"/>
-            <a:ext cx="13487400" cy="11172289"/>
-          </a:xfrm>
-          <a:prstGeom prst="rect">
-            <a:avLst/>
-          </a:prstGeom>
-          <a:noFill/>
-        </p:spPr>
-        <p:txBody>
-          <a:bodyPr wrap="square" rtlCol="0">
-            <a:spAutoFit/>
-          </a:bodyPr>
-          <a:lstStyle/>
-          <a:p>
-            <a:r>
-              <a:rPr lang="en-US" sz="6000" dirty="0" smtClean="0"/>
-              <a:t>The marionette DAQ is a an open source data acquisition device designed for the Portland State Aeronautical Society for use in their rocket launches. The underlying goal of the project is to provide a DAQ that is : </a:t>
-            </a:r>
-          </a:p>
-          <a:p>
-            <a:pPr marL="857250" indent="-857250">
-              <a:buFont typeface="Arial" panose="020B0604020202020204" pitchFamily="34" charset="0"/>
-              <a:buChar char="•"/>
-            </a:pPr>
-            <a:r>
-              <a:rPr lang="en-US" sz="6000" dirty="0" smtClean="0"/>
-              <a:t>Completely Open Source (Hardware, Firmware, and Software).</a:t>
-            </a:r>
-          </a:p>
-          <a:p>
-            <a:pPr marL="857250" indent="-857250">
-              <a:buFont typeface="Arial" panose="020B0604020202020204" pitchFamily="34" charset="0"/>
-              <a:buChar char="•"/>
-            </a:pPr>
-            <a:r>
-              <a:rPr lang="en-US" sz="6000" dirty="0" smtClean="0"/>
-              <a:t>Provides more connectivity than any other device currently on the market at a reasonable and affordable cost.</a:t>
-            </a:r>
-          </a:p>
-          <a:p>
-            <a:endParaRPr lang="en-US" sz="6000" dirty="0"/>
-          </a:p>
-        </p:txBody>
-      </p:sp>
-      <p:sp>
-        <p:nvSpPr>
-          <p:cNvPr id="20" name="TextBox 19"/>
-          <p:cNvSpPr txBox="1"/>
-          <p:nvPr/>
-        </p:nvSpPr>
-        <p:spPr>
-          <a:xfrm>
-            <a:off x="993516" y="18651556"/>
+            <a:off x="990600" y="14935200"/>
             <a:ext cx="13487400" cy="1431161"/>
           </a:xfrm>
           <a:prstGeom prst="rect">
@@ -3400,349 +3585,13 @@
                   <a:srgbClr val="6A7F10"/>
                 </a:solidFill>
               </a:rPr>
-              <a:t>Solution</a:t>
+              <a:t>Requirements</a:t>
             </a:r>
             <a:endParaRPr lang="en-US" dirty="0">
               <a:solidFill>
                 <a:srgbClr val="6A7F10"/>
               </a:solidFill>
             </a:endParaRPr>
-          </a:p>
-        </p:txBody>
-      </p:sp>
-      <p:sp>
-        <p:nvSpPr>
-          <p:cNvPr id="21" name="TextBox 20"/>
-          <p:cNvSpPr txBox="1"/>
-          <p:nvPr/>
-        </p:nvSpPr>
-        <p:spPr>
-          <a:xfrm>
-            <a:off x="997527" y="20082717"/>
-            <a:ext cx="13487400" cy="8402300"/>
-          </a:xfrm>
-          <a:prstGeom prst="rect">
-            <a:avLst/>
-          </a:prstGeom>
-          <a:noFill/>
-        </p:spPr>
-        <p:txBody>
-          <a:bodyPr wrap="square" rtlCol="0">
-            <a:spAutoFit/>
-          </a:bodyPr>
-          <a:lstStyle/>
-          <a:p>
-            <a:pPr marL="857250" indent="-857250">
-              <a:buFont typeface="Arial" panose="020B0604020202020204" pitchFamily="34" charset="0"/>
-              <a:buChar char="•"/>
-            </a:pPr>
-            <a:r>
-              <a:rPr lang="en-US" sz="6000" dirty="0" smtClean="0"/>
-              <a:t>Off the shelf 32bit microcontroller with high speed USB</a:t>
-            </a:r>
-          </a:p>
-          <a:p>
-            <a:pPr marL="857250" indent="-857250">
-              <a:buFont typeface="Arial" panose="020B0604020202020204" pitchFamily="34" charset="0"/>
-              <a:buChar char="•"/>
-            </a:pPr>
-            <a:r>
-              <a:rPr lang="en-US" sz="6000" dirty="0" smtClean="0"/>
-              <a:t>Easy to assemble, components can be placed by hand.</a:t>
-            </a:r>
-          </a:p>
-          <a:p>
-            <a:pPr marL="857250" indent="-857250">
-              <a:buFont typeface="Arial" panose="020B0604020202020204" pitchFamily="34" charset="0"/>
-              <a:buChar char="•"/>
-            </a:pPr>
-            <a:r>
-              <a:rPr lang="en-US" sz="6000" dirty="0" smtClean="0"/>
-              <a:t>A real time operating system (</a:t>
-            </a:r>
-            <a:r>
-              <a:rPr lang="en-US" sz="6000" dirty="0" err="1" smtClean="0"/>
-              <a:t>ChibiOS</a:t>
-            </a:r>
-            <a:r>
-              <a:rPr lang="en-US" sz="6000" dirty="0" smtClean="0"/>
-              <a:t>) with customized drivers and libraries</a:t>
-            </a:r>
-          </a:p>
-          <a:p>
-            <a:pPr marL="857250" indent="-857250">
-              <a:buFont typeface="Arial" panose="020B0604020202020204" pitchFamily="34" charset="0"/>
-              <a:buChar char="•"/>
-            </a:pPr>
-            <a:r>
-              <a:rPr lang="en-US" sz="6000" dirty="0" smtClean="0"/>
-              <a:t>Uses the Python scripting language for a fully customizable, </a:t>
-            </a:r>
-            <a:r>
-              <a:rPr lang="en-US" sz="6000" dirty="0"/>
-              <a:t>cross-platform </a:t>
-            </a:r>
-            <a:r>
-              <a:rPr lang="en-US" sz="6000" dirty="0" smtClean="0"/>
-              <a:t>user interface. </a:t>
-            </a:r>
-            <a:endParaRPr lang="en-US" sz="6000" dirty="0"/>
-          </a:p>
-        </p:txBody>
-      </p:sp>
-      <p:sp>
-        <p:nvSpPr>
-          <p:cNvPr id="22" name="TextBox 21"/>
-          <p:cNvSpPr txBox="1"/>
-          <p:nvPr/>
-        </p:nvSpPr>
-        <p:spPr>
-          <a:xfrm>
-            <a:off x="16195412" y="20460269"/>
-            <a:ext cx="13487400" cy="1431161"/>
-          </a:xfrm>
-          <a:prstGeom prst="rect">
-            <a:avLst/>
-          </a:prstGeom>
-          <a:noFill/>
-          <a:ln>
-            <a:solidFill>
-              <a:schemeClr val="accent1"/>
-            </a:solidFill>
-          </a:ln>
-        </p:spPr>
-        <p:txBody>
-          <a:bodyPr wrap="square" rtlCol="0">
-            <a:spAutoFit/>
-          </a:bodyPr>
-          <a:lstStyle/>
-          <a:p>
-            <a:pPr algn="ctr"/>
-            <a:r>
-              <a:rPr lang="en-US" dirty="0" smtClean="0">
-                <a:solidFill>
-                  <a:srgbClr val="6A7F10"/>
-                </a:solidFill>
-              </a:rPr>
-              <a:t>Contributing Members</a:t>
-            </a:r>
-            <a:endParaRPr lang="en-US" dirty="0">
-              <a:solidFill>
-                <a:srgbClr val="6A7F10"/>
-              </a:solidFill>
-            </a:endParaRPr>
-          </a:p>
-        </p:txBody>
-      </p:sp>
-      <p:sp>
-        <p:nvSpPr>
-          <p:cNvPr id="24" name="TextBox 23"/>
-          <p:cNvSpPr txBox="1"/>
-          <p:nvPr/>
-        </p:nvSpPr>
-        <p:spPr>
-          <a:xfrm>
-            <a:off x="16195412" y="21891430"/>
-            <a:ext cx="13487400" cy="2862322"/>
-          </a:xfrm>
-          <a:prstGeom prst="rect">
-            <a:avLst/>
-          </a:prstGeom>
-          <a:noFill/>
-        </p:spPr>
-        <p:txBody>
-          <a:bodyPr wrap="square" rtlCol="0">
-            <a:spAutoFit/>
-          </a:bodyPr>
-          <a:lstStyle/>
-          <a:p>
-            <a:r>
-              <a:rPr lang="en-US" sz="6000" dirty="0" smtClean="0"/>
-              <a:t>Capstone Team:</a:t>
-            </a:r>
-          </a:p>
-          <a:p>
-            <a:pPr marL="857250" indent="-857250">
-              <a:buFont typeface="Arial" panose="020B0604020202020204" pitchFamily="34" charset="0"/>
-              <a:buChar char="•"/>
-            </a:pPr>
-            <a:r>
-              <a:rPr lang="en-US" sz="6000" dirty="0" smtClean="0"/>
-              <a:t>Jeff </a:t>
-            </a:r>
-            <a:r>
-              <a:rPr lang="en-US" sz="6000" dirty="0" err="1" smtClean="0"/>
-              <a:t>Alcoke</a:t>
-            </a:r>
-            <a:r>
-              <a:rPr lang="en-US" sz="6000" dirty="0" smtClean="0"/>
-              <a:t>, ECE –Project HW Designer </a:t>
-            </a:r>
-          </a:p>
-          <a:p>
-            <a:pPr marL="857250" indent="-857250">
-              <a:buFont typeface="Arial" panose="020B0604020202020204" pitchFamily="34" charset="0"/>
-              <a:buChar char="•"/>
-            </a:pPr>
-            <a:r>
-              <a:rPr lang="en-US" sz="6000" dirty="0" smtClean="0"/>
-              <a:t>Seth Ward, ECE – Project FW Designer</a:t>
-            </a:r>
-          </a:p>
-        </p:txBody>
-      </p:sp>
-      <p:sp>
-        <p:nvSpPr>
-          <p:cNvPr id="25" name="TextBox 24"/>
-          <p:cNvSpPr txBox="1"/>
-          <p:nvPr/>
-        </p:nvSpPr>
-        <p:spPr>
-          <a:xfrm>
-            <a:off x="30879858" y="14229278"/>
-            <a:ext cx="12506641" cy="1431161"/>
-          </a:xfrm>
-          <a:prstGeom prst="rect">
-            <a:avLst/>
-          </a:prstGeom>
-          <a:noFill/>
-          <a:ln>
-            <a:solidFill>
-              <a:schemeClr val="accent1"/>
-            </a:solidFill>
-          </a:ln>
-        </p:spPr>
-        <p:txBody>
-          <a:bodyPr wrap="square" rtlCol="0">
-            <a:spAutoFit/>
-          </a:bodyPr>
-          <a:lstStyle/>
-          <a:p>
-            <a:pPr algn="ctr"/>
-            <a:r>
-              <a:rPr lang="en-US" dirty="0" smtClean="0">
-                <a:solidFill>
-                  <a:srgbClr val="6A7F10"/>
-                </a:solidFill>
-              </a:rPr>
-              <a:t>More Stuff</a:t>
-            </a:r>
-            <a:endParaRPr lang="en-US" dirty="0">
-              <a:solidFill>
-                <a:srgbClr val="6A7F10"/>
-              </a:solidFill>
-            </a:endParaRPr>
-          </a:p>
-        </p:txBody>
-      </p:sp>
-      <p:sp>
-        <p:nvSpPr>
-          <p:cNvPr id="26" name="TextBox 25"/>
-          <p:cNvSpPr txBox="1"/>
-          <p:nvPr/>
-        </p:nvSpPr>
-        <p:spPr>
-          <a:xfrm>
-            <a:off x="16230600" y="25069800"/>
-            <a:ext cx="14684446" cy="3785652"/>
-          </a:xfrm>
-          <a:prstGeom prst="rect">
-            <a:avLst/>
-          </a:prstGeom>
-          <a:noFill/>
-        </p:spPr>
-        <p:txBody>
-          <a:bodyPr wrap="square" numCol="2" rtlCol="0">
-            <a:spAutoFit/>
-          </a:bodyPr>
-          <a:lstStyle/>
-          <a:p>
-            <a:endParaRPr lang="en-US" sz="6000" dirty="0" smtClean="0"/>
-          </a:p>
-          <a:p>
-            <a:pPr marL="857250" indent="-857250">
-              <a:buFont typeface="Arial" panose="020B0604020202020204" pitchFamily="34" charset="0"/>
-              <a:buChar char="•"/>
-            </a:pPr>
-            <a:r>
-              <a:rPr lang="en-US" sz="6000" dirty="0" smtClean="0"/>
-              <a:t>Andrew Greenberg</a:t>
-            </a:r>
-          </a:p>
-          <a:p>
-            <a:pPr marL="857250" indent="-857250">
-              <a:buFont typeface="Arial" panose="020B0604020202020204" pitchFamily="34" charset="0"/>
-              <a:buChar char="•"/>
-            </a:pPr>
-            <a:r>
-              <a:rPr lang="en-US" sz="6000" dirty="0" smtClean="0"/>
-              <a:t>K. Wilson</a:t>
-            </a:r>
-          </a:p>
-          <a:p>
-            <a:endParaRPr lang="en-US" sz="6000" dirty="0" smtClean="0"/>
-          </a:p>
-          <a:p>
-            <a:pPr marL="857250" indent="-857250">
-              <a:buFont typeface="Arial" panose="020B0604020202020204" pitchFamily="34" charset="0"/>
-              <a:buChar char="•"/>
-            </a:pPr>
-            <a:endParaRPr lang="en-US" sz="6000" dirty="0" smtClean="0"/>
-          </a:p>
-          <a:p>
-            <a:pPr marL="857250" indent="-857250">
-              <a:buFont typeface="Arial" panose="020B0604020202020204" pitchFamily="34" charset="0"/>
-              <a:buChar char="•"/>
-            </a:pPr>
-            <a:r>
-              <a:rPr lang="en-US" sz="6000" dirty="0" smtClean="0"/>
-              <a:t>Gavin </a:t>
-            </a:r>
-            <a:r>
-              <a:rPr lang="en-US" sz="6000" dirty="0" err="1" smtClean="0"/>
-              <a:t>Gallino</a:t>
-            </a:r>
-            <a:endParaRPr lang="en-US" sz="6000" dirty="0" smtClean="0"/>
-          </a:p>
-          <a:p>
-            <a:pPr marL="857250" indent="-857250">
-              <a:buFont typeface="Arial" panose="020B0604020202020204" pitchFamily="34" charset="0"/>
-              <a:buChar char="•"/>
-            </a:pPr>
-            <a:r>
-              <a:rPr lang="en-US" sz="6000" dirty="0" smtClean="0"/>
-              <a:t>Dave Camarillo</a:t>
-            </a:r>
-            <a:endParaRPr lang="en-US" sz="6000" dirty="0"/>
-          </a:p>
-        </p:txBody>
-      </p:sp>
-      <p:sp>
-        <p:nvSpPr>
-          <p:cNvPr id="27" name="TextBox 26"/>
-          <p:cNvSpPr txBox="1"/>
-          <p:nvPr/>
-        </p:nvSpPr>
-        <p:spPr>
-          <a:xfrm>
-            <a:off x="16230600" y="25069800"/>
-            <a:ext cx="13487400" cy="1015663"/>
-          </a:xfrm>
-          <a:prstGeom prst="rect">
-            <a:avLst/>
-          </a:prstGeom>
-          <a:noFill/>
-        </p:spPr>
-        <p:txBody>
-          <a:bodyPr wrap="square" rtlCol="0">
-            <a:spAutoFit/>
-          </a:bodyPr>
-          <a:lstStyle/>
-          <a:p>
-            <a:r>
-              <a:rPr lang="en-US" sz="6000" dirty="0" smtClean="0"/>
-              <a:t>Special thanks to:</a:t>
-            </a:r>
           </a:p>
         </p:txBody>
       </p:sp>
@@ -3806,6 +3655,275 @@
           </a:p>
         </p:txBody>
       </p:sp>
+      <p:pic>
+        <p:nvPicPr>
+          <p:cNvPr id="13" name="Picture 12" descr="marionette_block.eps"/>
+          <p:cNvPicPr>
+            <a:picLocks noChangeAspect="1"/>
+          </p:cNvPicPr>
+          <p:nvPr/>
+        </p:nvPicPr>
+        <p:blipFill>
+          <a:blip r:embed="rId6">
+            <a:extLst>
+              <a:ext uri="{28A0092B-C50C-407E-A947-70E740481C1C}">
+                <a14:useLocalDpi xmlns:a14="http://schemas.microsoft.com/office/drawing/2010/main" val="0"/>
+              </a:ext>
+            </a:extLst>
+          </a:blip>
+          <a:stretch>
+            <a:fillRect/>
+          </a:stretch>
+        </p:blipFill>
+        <p:spPr>
+          <a:xfrm>
+            <a:off x="15773400" y="12268200"/>
+            <a:ext cx="11963400" cy="8510727"/>
+          </a:xfrm>
+          <a:prstGeom prst="rect">
+            <a:avLst/>
+          </a:prstGeom>
+        </p:spPr>
+      </p:pic>
+      <p:grpSp>
+        <p:nvGrpSpPr>
+          <p:cNvPr id="16" name="Group 15"/>
+          <p:cNvGrpSpPr/>
+          <p:nvPr/>
+        </p:nvGrpSpPr>
+        <p:grpSpPr>
+          <a:xfrm>
+            <a:off x="29032200" y="22250400"/>
+            <a:ext cx="13563600" cy="6153329"/>
+            <a:chOff x="29108400" y="23164800"/>
+            <a:chExt cx="13563600" cy="6153329"/>
+          </a:xfrm>
+        </p:grpSpPr>
+        <p:sp>
+          <p:nvSpPr>
+            <p:cNvPr id="22" name="TextBox 21"/>
+            <p:cNvSpPr txBox="1"/>
+            <p:nvPr/>
+          </p:nvSpPr>
+          <p:spPr>
+            <a:xfrm>
+              <a:off x="29184600" y="23164800"/>
+              <a:ext cx="13487400" cy="1431161"/>
+            </a:xfrm>
+            <a:prstGeom prst="rect">
+              <a:avLst/>
+            </a:prstGeom>
+            <a:noFill/>
+            <a:ln>
+              <a:solidFill>
+                <a:schemeClr val="accent1"/>
+              </a:solidFill>
+            </a:ln>
+          </p:spPr>
+          <p:txBody>
+            <a:bodyPr wrap="square" rtlCol="0">
+              <a:spAutoFit/>
+            </a:bodyPr>
+            <a:lstStyle/>
+            <a:p>
+              <a:pPr algn="ctr"/>
+              <a:r>
+                <a:rPr lang="en-US" dirty="0" smtClean="0">
+                  <a:solidFill>
+                    <a:srgbClr val="6A7F10"/>
+                  </a:solidFill>
+                </a:rPr>
+                <a:t>Contributing Members</a:t>
+              </a:r>
+              <a:endParaRPr lang="en-US" dirty="0">
+                <a:solidFill>
+                  <a:srgbClr val="6A7F10"/>
+                </a:solidFill>
+              </a:endParaRPr>
+            </a:p>
+          </p:txBody>
+        </p:sp>
+        <p:sp>
+          <p:nvSpPr>
+            <p:cNvPr id="24" name="TextBox 23"/>
+            <p:cNvSpPr txBox="1"/>
+            <p:nvPr/>
+          </p:nvSpPr>
+          <p:spPr>
+            <a:xfrm>
+              <a:off x="29108400" y="24612600"/>
+              <a:ext cx="13487400" cy="2492990"/>
+            </a:xfrm>
+            <a:prstGeom prst="rect">
+              <a:avLst/>
+            </a:prstGeom>
+            <a:noFill/>
+          </p:spPr>
+          <p:txBody>
+            <a:bodyPr wrap="square" rtlCol="0">
+              <a:spAutoFit/>
+            </a:bodyPr>
+            <a:lstStyle/>
+            <a:p>
+              <a:r>
+                <a:rPr lang="en-US" sz="6000" dirty="0" smtClean="0"/>
+                <a:t>Capstone Team:</a:t>
+              </a:r>
+            </a:p>
+            <a:p>
+              <a:pPr marL="857250" indent="-857250">
+                <a:buFont typeface="Arial" panose="020B0604020202020204" pitchFamily="34" charset="0"/>
+                <a:buChar char="•"/>
+              </a:pPr>
+              <a:r>
+                <a:rPr lang="en-US" sz="4800" dirty="0" smtClean="0"/>
+                <a:t>Jeff Alcoke, ECE </a:t>
+              </a:r>
+              <a:r>
+                <a:rPr lang="en-US" sz="4800" dirty="0" smtClean="0"/>
+                <a:t>– Project </a:t>
+              </a:r>
+              <a:r>
+                <a:rPr lang="en-US" sz="4800" dirty="0" smtClean="0"/>
+                <a:t>HW Designer </a:t>
+              </a:r>
+            </a:p>
+            <a:p>
+              <a:pPr marL="857250" indent="-857250">
+                <a:buFont typeface="Arial" panose="020B0604020202020204" pitchFamily="34" charset="0"/>
+                <a:buChar char="•"/>
+              </a:pPr>
+              <a:r>
+                <a:rPr lang="en-US" sz="4800" dirty="0" smtClean="0"/>
+                <a:t>Seth Ward, ECE – Project FW </a:t>
+              </a:r>
+              <a:r>
+                <a:rPr lang="en-US" sz="4800" dirty="0" smtClean="0"/>
+                <a:t> Designer</a:t>
+              </a:r>
+              <a:endParaRPr lang="en-US" sz="4800" dirty="0" smtClean="0"/>
+            </a:p>
+          </p:txBody>
+        </p:sp>
+        <p:grpSp>
+          <p:nvGrpSpPr>
+            <p:cNvPr id="15" name="Group 14"/>
+            <p:cNvGrpSpPr/>
+            <p:nvPr/>
+          </p:nvGrpSpPr>
+          <p:grpSpPr>
+            <a:xfrm>
+              <a:off x="29184600" y="27432000"/>
+              <a:ext cx="13335000" cy="1886129"/>
+              <a:chOff x="31546800" y="27432000"/>
+              <a:chExt cx="13335000" cy="1886129"/>
+            </a:xfrm>
+          </p:grpSpPr>
+          <p:sp>
+            <p:nvSpPr>
+              <p:cNvPr id="27" name="TextBox 26"/>
+              <p:cNvSpPr txBox="1"/>
+              <p:nvPr/>
+            </p:nvSpPr>
+            <p:spPr>
+              <a:xfrm>
+                <a:off x="31546800" y="27432000"/>
+                <a:ext cx="10972800" cy="830997"/>
+              </a:xfrm>
+              <a:prstGeom prst="rect">
+                <a:avLst/>
+              </a:prstGeom>
+              <a:noFill/>
+            </p:spPr>
+            <p:txBody>
+              <a:bodyPr wrap="square" rtlCol="0">
+                <a:spAutoFit/>
+              </a:bodyPr>
+              <a:lstStyle/>
+              <a:p>
+                <a:r>
+                  <a:rPr lang="en-US" sz="4800" dirty="0" smtClean="0"/>
+                  <a:t>Special thanks to:</a:t>
+                </a:r>
+              </a:p>
+            </p:txBody>
+          </p:sp>
+          <p:sp>
+            <p:nvSpPr>
+              <p:cNvPr id="14" name="TextBox 13"/>
+              <p:cNvSpPr txBox="1"/>
+              <p:nvPr/>
+            </p:nvSpPr>
+            <p:spPr>
+              <a:xfrm>
+                <a:off x="31546800" y="28117800"/>
+                <a:ext cx="13335000" cy="1200329"/>
+              </a:xfrm>
+              <a:prstGeom prst="rect">
+                <a:avLst/>
+              </a:prstGeom>
+              <a:noFill/>
+            </p:spPr>
+            <p:txBody>
+              <a:bodyPr wrap="square" numCol="2" rtlCol="0">
+                <a:spAutoFit/>
+              </a:bodyPr>
+              <a:lstStyle/>
+              <a:p>
+                <a:pPr marL="1143000" indent="-1143000">
+                  <a:buFont typeface="Arial"/>
+                  <a:buChar char="•"/>
+                </a:pPr>
+                <a:r>
+                  <a:rPr lang="en-US" sz="3600" dirty="0" smtClean="0"/>
+                  <a:t>Andrew Greenberg</a:t>
+                </a:r>
+              </a:p>
+              <a:p>
+                <a:pPr marL="1143000" indent="-1143000">
+                  <a:buFont typeface="Arial"/>
+                  <a:buChar char="•"/>
+                </a:pPr>
+                <a:r>
+                  <a:rPr lang="en-US" sz="3600" dirty="0" smtClean="0"/>
+                  <a:t>K. </a:t>
+                </a:r>
+                <a:r>
+                  <a:rPr lang="en-US" sz="3600" dirty="0" err="1" smtClean="0"/>
+                  <a:t>Willson</a:t>
+                </a:r>
+                <a:endParaRPr lang="en-US" sz="3600" dirty="0" smtClean="0"/>
+              </a:p>
+              <a:p>
+                <a:pPr marL="1143000" indent="-1143000">
+                  <a:buFont typeface="Arial"/>
+                  <a:buChar char="•"/>
+                </a:pPr>
+                <a:r>
+                  <a:rPr lang="en-US" sz="3600" dirty="0" smtClean="0"/>
+                  <a:t>Gavin </a:t>
+                </a:r>
+                <a:r>
+                  <a:rPr lang="en-US" sz="3600" dirty="0" err="1" smtClean="0"/>
+                  <a:t>Gallino</a:t>
+                </a:r>
+                <a:endParaRPr lang="en-US" sz="3600" dirty="0" smtClean="0"/>
+              </a:p>
+              <a:p>
+                <a:pPr marL="1143000" indent="-1143000">
+                  <a:buFont typeface="Arial"/>
+                  <a:buChar char="•"/>
+                </a:pPr>
+                <a:r>
+                  <a:rPr lang="en-US" sz="3600" dirty="0" smtClean="0"/>
+                  <a:t>Dave Camarillo</a:t>
+                </a:r>
+                <a:endParaRPr lang="en-US" sz="3600" dirty="0"/>
+              </a:p>
+            </p:txBody>
+          </p:sp>
+        </p:grpSp>
+      </p:grpSp>
     </p:spTree>
   </p:cSld>
   <p:clrMapOvr>

</xml_diff>

<commit_message>
Small change to Results
</commit_message>
<xml_diff>
--- a/Poster.pptx
+++ b/Poster.pptx
@@ -300,7 +300,7 @@
             <a:fld id="{D9D26CB9-01E4-44B8-8084-BCC418CF4A2D}" type="datetimeFigureOut">
               <a:rPr lang="en-US" smtClean="0"/>
               <a:pPr/>
-              <a:t>5/27/2015</a:t>
+              <a:t>5/27/15</a:t>
             </a:fld>
             <a:endParaRPr lang="en-US" dirty="0"/>
           </a:p>
@@ -467,7 +467,7 @@
             <a:fld id="{D9D26CB9-01E4-44B8-8084-BCC418CF4A2D}" type="datetimeFigureOut">
               <a:rPr lang="en-US" smtClean="0"/>
               <a:pPr/>
-              <a:t>5/27/2015</a:t>
+              <a:t>5/27/15</a:t>
             </a:fld>
             <a:endParaRPr lang="en-US" dirty="0"/>
           </a:p>
@@ -644,7 +644,7 @@
             <a:fld id="{D9D26CB9-01E4-44B8-8084-BCC418CF4A2D}" type="datetimeFigureOut">
               <a:rPr lang="en-US" smtClean="0"/>
               <a:pPr/>
-              <a:t>5/27/2015</a:t>
+              <a:t>5/27/15</a:t>
             </a:fld>
             <a:endParaRPr lang="en-US" dirty="0"/>
           </a:p>
@@ -811,7 +811,7 @@
             <a:fld id="{D9D26CB9-01E4-44B8-8084-BCC418CF4A2D}" type="datetimeFigureOut">
               <a:rPr lang="en-US" smtClean="0"/>
               <a:pPr/>
-              <a:t>5/27/2015</a:t>
+              <a:t>5/27/15</a:t>
             </a:fld>
             <a:endParaRPr lang="en-US" dirty="0"/>
           </a:p>
@@ -1054,7 +1054,7 @@
             <a:fld id="{D9D26CB9-01E4-44B8-8084-BCC418CF4A2D}" type="datetimeFigureOut">
               <a:rPr lang="en-US" smtClean="0"/>
               <a:pPr/>
-              <a:t>5/27/2015</a:t>
+              <a:t>5/27/15</a:t>
             </a:fld>
             <a:endParaRPr lang="en-US" dirty="0"/>
           </a:p>
@@ -1339,7 +1339,7 @@
             <a:fld id="{D9D26CB9-01E4-44B8-8084-BCC418CF4A2D}" type="datetimeFigureOut">
               <a:rPr lang="en-US" smtClean="0"/>
               <a:pPr/>
-              <a:t>5/27/2015</a:t>
+              <a:t>5/27/15</a:t>
             </a:fld>
             <a:endParaRPr lang="en-US" dirty="0"/>
           </a:p>
@@ -1758,7 +1758,7 @@
             <a:fld id="{D9D26CB9-01E4-44B8-8084-BCC418CF4A2D}" type="datetimeFigureOut">
               <a:rPr lang="en-US" smtClean="0"/>
               <a:pPr/>
-              <a:t>5/27/2015</a:t>
+              <a:t>5/27/15</a:t>
             </a:fld>
             <a:endParaRPr lang="en-US" dirty="0"/>
           </a:p>
@@ -1873,7 +1873,7 @@
             <a:fld id="{D9D26CB9-01E4-44B8-8084-BCC418CF4A2D}" type="datetimeFigureOut">
               <a:rPr lang="en-US" smtClean="0"/>
               <a:pPr/>
-              <a:t>5/27/2015</a:t>
+              <a:t>5/27/15</a:t>
             </a:fld>
             <a:endParaRPr lang="en-US" dirty="0"/>
           </a:p>
@@ -1965,7 +1965,7 @@
             <a:fld id="{D9D26CB9-01E4-44B8-8084-BCC418CF4A2D}" type="datetimeFigureOut">
               <a:rPr lang="en-US" smtClean="0"/>
               <a:pPr/>
-              <a:t>5/27/2015</a:t>
+              <a:t>5/27/15</a:t>
             </a:fld>
             <a:endParaRPr lang="en-US" dirty="0"/>
           </a:p>
@@ -2239,7 +2239,7 @@
             <a:fld id="{D9D26CB9-01E4-44B8-8084-BCC418CF4A2D}" type="datetimeFigureOut">
               <a:rPr lang="en-US" smtClean="0"/>
               <a:pPr/>
-              <a:t>5/27/2015</a:t>
+              <a:t>5/27/15</a:t>
             </a:fld>
             <a:endParaRPr lang="en-US" dirty="0"/>
           </a:p>
@@ -2489,7 +2489,7 @@
             <a:fld id="{D9D26CB9-01E4-44B8-8084-BCC418CF4A2D}" type="datetimeFigureOut">
               <a:rPr lang="en-US" smtClean="0"/>
               <a:pPr/>
-              <a:t>5/27/2015</a:t>
+              <a:t>5/27/15</a:t>
             </a:fld>
             <a:endParaRPr lang="en-US" dirty="0"/>
           </a:p>
@@ -2699,7 +2699,7 @@
             <a:fld id="{D9D26CB9-01E4-44B8-8084-BCC418CF4A2D}" type="datetimeFigureOut">
               <a:rPr lang="en-US" smtClean="0"/>
               <a:pPr/>
-              <a:t>5/27/2015</a:t>
+              <a:t>5/27/15</a:t>
             </a:fld>
             <a:endParaRPr lang="en-US" dirty="0"/>
           </a:p>
@@ -3878,9 +3878,9 @@
         <p:grpSpPr>
           <a:xfrm>
             <a:off x="914400" y="16310776"/>
-            <a:ext cx="13563600" cy="8174301"/>
+            <a:ext cx="13563600" cy="7497192"/>
             <a:chOff x="990600" y="14935200"/>
-            <a:chExt cx="13563600" cy="8174301"/>
+            <a:chExt cx="13563600" cy="7497192"/>
           </a:xfrm>
         </p:grpSpPr>
         <p:sp>
@@ -3936,7 +3936,7 @@
           <p:spPr>
             <a:xfrm>
               <a:off x="1066800" y="16923192"/>
-              <a:ext cx="13487400" cy="6186309"/>
+              <a:ext cx="13487400" cy="5509200"/>
             </a:xfrm>
             <a:prstGeom prst="rect">
               <a:avLst/>
@@ -3976,23 +3976,27 @@
             <a:p>
               <a:r>
                 <a:rPr lang="en-US" sz="4400" dirty="0" smtClean="0"/>
-                <a:t>There </a:t>
+                <a:t>There is a demand to replace </a:t>
               </a:r>
               <a:r>
                 <a:rPr lang="en-US" sz="4400" dirty="0" smtClean="0"/>
-                <a:t>is a </a:t>
+                <a:t>the </a:t>
               </a:r>
               <a:r>
                 <a:rPr lang="en-US" sz="4400" dirty="0" smtClean="0"/>
-                <a:t>demand to </a:t>
+                <a:t>complicated, </a:t>
+              </a:r>
+              <a:r>
+                <a:rPr lang="en-US" sz="4400" smtClean="0"/>
+                <a:t>poorly </a:t>
+              </a:r>
+              <a:r>
+                <a:rPr lang="en-US" sz="4400" smtClean="0"/>
+                <a:t>documented </a:t>
               </a:r>
               <a:r>
                 <a:rPr lang="en-US" sz="4400" dirty="0" smtClean="0"/>
-                <a:t>replace the learning curve of complicated, poorly written documentation and system restricted devices to a simple, flexible, and easy to use </a:t>
-              </a:r>
-              <a:r>
-                <a:rPr lang="en-US" sz="4400" dirty="0" smtClean="0"/>
-                <a:t>DAQ.</a:t>
+                <a:t>and system restricted devices to a simple, flexible, and easy to use DAQ.</a:t>
               </a:r>
               <a:endParaRPr lang="en-US" sz="4400" dirty="0"/>
             </a:p>
@@ -4052,7 +4056,7 @@
         <p:spPr>
           <a:xfrm>
             <a:off x="29150247" y="17951441"/>
-            <a:ext cx="13487400" cy="3477875"/>
+            <a:ext cx="13487400" cy="4154983"/>
           </a:xfrm>
           <a:prstGeom prst="rect">
             <a:avLst/>
@@ -4075,8 +4079,25 @@
             </a:r>
             <a:r>
               <a:rPr lang="en-US" sz="4400" dirty="0" smtClean="0"/>
-              <a:t>Marionette-v1 custom board</a:t>
-            </a:r>
+              <a:t>three</a:t>
+            </a:r>
+            <a:r>
+              <a:rPr lang="en-US" sz="4400" dirty="0" smtClean="0"/>
+              <a:t> Marionette</a:t>
+            </a:r>
+            <a:r>
+              <a:rPr lang="en-US" sz="4400" dirty="0" smtClean="0"/>
+              <a:t>-v1 custom </a:t>
+            </a:r>
+            <a:r>
+              <a:rPr lang="en-US" sz="4400" dirty="0" smtClean="0"/>
+              <a:t>boards for a cost of $130 </a:t>
+            </a:r>
+            <a:r>
+              <a:rPr lang="en-US" sz="4400" dirty="0" err="1" smtClean="0"/>
+              <a:t>ea</a:t>
+            </a:r>
+            <a:endParaRPr lang="en-US" sz="4400" dirty="0" smtClean="0"/>
           </a:p>
           <a:p>
             <a:pPr marL="571500" indent="-571500">
@@ -4107,7 +4128,6 @@
               <a:rPr lang="en-US" sz="4400" dirty="0" smtClean="0"/>
               <a:t>Enhanced existing DAC library to interact with an external DAC IC</a:t>
             </a:r>
-            <a:endParaRPr lang="en-US" sz="4400" dirty="0" smtClean="0"/>
           </a:p>
         </p:txBody>
       </p:sp>
@@ -4119,7 +4139,7 @@
   <p:timing>
     <p:tnLst>
       <p:par>
-        <p:cTn id="1" dur="indefinite" restart="never" nodeType="tmRoot"/>
+        <p:cTn xmlns:p14="http://schemas.microsoft.com/office/powerpoint/2010/main" id="1" dur="indefinite" restart="never" nodeType="tmRoot"/>
       </p:par>
     </p:tnLst>
   </p:timing>

</xml_diff>